<commit_message>
edited : proejct presentation
</commit_message>
<xml_diff>
--- a/projects/mlops_study_project_description.pptx
+++ b/projects/mlops_study_project_description.pptx
@@ -11,6 +11,8 @@
     <p:sldId id="259" r:id="rId5"/>
     <p:sldId id="260" r:id="rId6"/>
     <p:sldId id="261" r:id="rId7"/>
+    <p:sldId id="262" r:id="rId8"/>
+    <p:sldId id="263" r:id="rId9"/>
   </p:sldIdLst>
   <p:sldSz cx="12192000" cy="6858000"/>
   <p:notesSz cx="6858000" cy="9144000"/>
@@ -109,6 +111,11 @@
       </a:defRPr>
     </a:lvl9pPr>
   </p:defaultTextStyle>
+  <p:extLst>
+    <p:ext uri="{EFAFB233-063F-42B5-8137-9DF3F51BA10A}">
+      <p15:sldGuideLst xmlns:p15="http://schemas.microsoft.com/office/powerpoint/2012/main"/>
+    </p:ext>
+  </p:extLst>
 </p:presentation>
 </file>
 
@@ -261,7 +268,7 @@
           <a:p>
             <a:fld id="{17B93DD3-6B4D-DD48-8428-A62BE598A940}" type="datetimeFigureOut">
               <a:rPr kumimoji="1" lang="ko-Kore-KR" altLang="en-US" smtClean="0"/>
-              <a:t>2022. 1. 12.</a:t>
+              <a:t>2022. 1. 23.</a:t>
             </a:fld>
             <a:endParaRPr kumimoji="1" lang="ko-Kore-KR" altLang="en-US"/>
           </a:p>
@@ -461,7 +468,7 @@
           <a:p>
             <a:fld id="{17B93DD3-6B4D-DD48-8428-A62BE598A940}" type="datetimeFigureOut">
               <a:rPr kumimoji="1" lang="ko-Kore-KR" altLang="en-US" smtClean="0"/>
-              <a:t>2022. 1. 12.</a:t>
+              <a:t>2022. 1. 23.</a:t>
             </a:fld>
             <a:endParaRPr kumimoji="1" lang="ko-Kore-KR" altLang="en-US"/>
           </a:p>
@@ -671,7 +678,7 @@
           <a:p>
             <a:fld id="{17B93DD3-6B4D-DD48-8428-A62BE598A940}" type="datetimeFigureOut">
               <a:rPr kumimoji="1" lang="ko-Kore-KR" altLang="en-US" smtClean="0"/>
-              <a:t>2022. 1. 12.</a:t>
+              <a:t>2022. 1. 23.</a:t>
             </a:fld>
             <a:endParaRPr kumimoji="1" lang="ko-Kore-KR" altLang="en-US"/>
           </a:p>
@@ -871,7 +878,7 @@
           <a:p>
             <a:fld id="{17B93DD3-6B4D-DD48-8428-A62BE598A940}" type="datetimeFigureOut">
               <a:rPr kumimoji="1" lang="ko-Kore-KR" altLang="en-US" smtClean="0"/>
-              <a:t>2022. 1. 12.</a:t>
+              <a:t>2022. 1. 23.</a:t>
             </a:fld>
             <a:endParaRPr kumimoji="1" lang="ko-Kore-KR" altLang="en-US"/>
           </a:p>
@@ -1147,7 +1154,7 @@
           <a:p>
             <a:fld id="{17B93DD3-6B4D-DD48-8428-A62BE598A940}" type="datetimeFigureOut">
               <a:rPr kumimoji="1" lang="ko-Kore-KR" altLang="en-US" smtClean="0"/>
-              <a:t>2022. 1. 12.</a:t>
+              <a:t>2022. 1. 23.</a:t>
             </a:fld>
             <a:endParaRPr kumimoji="1" lang="ko-Kore-KR" altLang="en-US"/>
           </a:p>
@@ -1415,7 +1422,7 @@
           <a:p>
             <a:fld id="{17B93DD3-6B4D-DD48-8428-A62BE598A940}" type="datetimeFigureOut">
               <a:rPr kumimoji="1" lang="ko-Kore-KR" altLang="en-US" smtClean="0"/>
-              <a:t>2022. 1. 12.</a:t>
+              <a:t>2022. 1. 23.</a:t>
             </a:fld>
             <a:endParaRPr kumimoji="1" lang="ko-Kore-KR" altLang="en-US"/>
           </a:p>
@@ -1830,7 +1837,7 @@
           <a:p>
             <a:fld id="{17B93DD3-6B4D-DD48-8428-A62BE598A940}" type="datetimeFigureOut">
               <a:rPr kumimoji="1" lang="ko-Kore-KR" altLang="en-US" smtClean="0"/>
-              <a:t>2022. 1. 12.</a:t>
+              <a:t>2022. 1. 23.</a:t>
             </a:fld>
             <a:endParaRPr kumimoji="1" lang="ko-Kore-KR" altLang="en-US"/>
           </a:p>
@@ -1972,7 +1979,7 @@
           <a:p>
             <a:fld id="{17B93DD3-6B4D-DD48-8428-A62BE598A940}" type="datetimeFigureOut">
               <a:rPr kumimoji="1" lang="ko-Kore-KR" altLang="en-US" smtClean="0"/>
-              <a:t>2022. 1. 12.</a:t>
+              <a:t>2022. 1. 23.</a:t>
             </a:fld>
             <a:endParaRPr kumimoji="1" lang="ko-Kore-KR" altLang="en-US"/>
           </a:p>
@@ -2085,7 +2092,7 @@
           <a:p>
             <a:fld id="{17B93DD3-6B4D-DD48-8428-A62BE598A940}" type="datetimeFigureOut">
               <a:rPr kumimoji="1" lang="ko-Kore-KR" altLang="en-US" smtClean="0"/>
-              <a:t>2022. 1. 12.</a:t>
+              <a:t>2022. 1. 23.</a:t>
             </a:fld>
             <a:endParaRPr kumimoji="1" lang="ko-Kore-KR" altLang="en-US"/>
           </a:p>
@@ -2398,7 +2405,7 @@
           <a:p>
             <a:fld id="{17B93DD3-6B4D-DD48-8428-A62BE598A940}" type="datetimeFigureOut">
               <a:rPr kumimoji="1" lang="ko-Kore-KR" altLang="en-US" smtClean="0"/>
-              <a:t>2022. 1. 12.</a:t>
+              <a:t>2022. 1. 23.</a:t>
             </a:fld>
             <a:endParaRPr kumimoji="1" lang="ko-Kore-KR" altLang="en-US"/>
           </a:p>
@@ -2687,7 +2694,7 @@
           <a:p>
             <a:fld id="{17B93DD3-6B4D-DD48-8428-A62BE598A940}" type="datetimeFigureOut">
               <a:rPr kumimoji="1" lang="ko-Kore-KR" altLang="en-US" smtClean="0"/>
-              <a:t>2022. 1. 12.</a:t>
+              <a:t>2022. 1. 23.</a:t>
             </a:fld>
             <a:endParaRPr kumimoji="1" lang="ko-Kore-KR" altLang="en-US"/>
           </a:p>
@@ -2930,7 +2937,7 @@
           <a:p>
             <a:fld id="{17B93DD3-6B4D-DD48-8428-A62BE598A940}" type="datetimeFigureOut">
               <a:rPr kumimoji="1" lang="ko-Kore-KR" altLang="en-US" smtClean="0"/>
-              <a:t>2022. 1. 12.</a:t>
+              <a:t>2022. 1. 23.</a:t>
             </a:fld>
             <a:endParaRPr kumimoji="1" lang="ko-Kore-KR" altLang="en-US"/>
           </a:p>
@@ -3361,7 +3368,7 @@
         </p:nvSpPr>
         <p:spPr>
           <a:xfrm>
-            <a:off x="4790699" y="4690594"/>
+            <a:off x="4790697" y="4690594"/>
             <a:ext cx="2610597" cy="430887"/>
           </a:xfrm>
           <a:prstGeom prst="rect">
@@ -3417,7 +3424,7 @@
                 <a:latin typeface="AppleMyungjo" pitchFamily="2" charset="-127"/>
                 <a:ea typeface="AppleMyungjo" pitchFamily="2" charset="-127"/>
               </a:rPr>
-              <a:t>ML2nd</a:t>
+              <a:t>MLB 2nd</a:t>
             </a:r>
             <a:r>
               <a:rPr kumimoji="1" lang="ko-KR" altLang="en-US" sz="1600" dirty="0">
@@ -3502,8 +3509,8 @@
         </p:nvSpPr>
         <p:spPr>
           <a:xfrm>
-            <a:off x="2472441" y="2138193"/>
-            <a:ext cx="7247111" cy="1323439"/>
+            <a:off x="2472441" y="2596416"/>
+            <a:ext cx="7247111" cy="707886"/>
           </a:xfrm>
           <a:prstGeom prst="rect">
             <a:avLst/>
@@ -3542,58 +3549,6 @@
                 <a:ea typeface="AppleMyungjo" pitchFamily="2" charset="-127"/>
               </a:rPr>
               <a:t> 작업 기술서</a:t>
-            </a:r>
-            <a:endParaRPr kumimoji="1" lang="en-US" altLang="ko-KR" sz="4000" spc="-150" dirty="0">
-              <a:solidFill>
-                <a:schemeClr val="tx1">
-                  <a:lumMod val="75000"/>
-                  <a:lumOff val="25000"/>
-                </a:schemeClr>
-              </a:solidFill>
-              <a:latin typeface="AppleMyungjo" pitchFamily="2" charset="-127"/>
-              <a:ea typeface="AppleMyungjo" pitchFamily="2" charset="-127"/>
-            </a:endParaRPr>
-          </a:p>
-          <a:p>
-            <a:pPr algn="ctr"/>
-            <a:r>
-              <a:rPr kumimoji="1" lang="ko-KR" altLang="en-US" sz="4000" spc="-150" dirty="0">
-                <a:solidFill>
-                  <a:schemeClr val="tx1">
-                    <a:lumMod val="75000"/>
-                    <a:lumOff val="25000"/>
-                  </a:schemeClr>
-                </a:solidFill>
-                <a:latin typeface="AppleMyungjo" pitchFamily="2" charset="-127"/>
-                <a:ea typeface="AppleMyungjo" pitchFamily="2" charset="-127"/>
-              </a:rPr>
-              <a:t>모델 평가 </a:t>
-            </a:r>
-            <a:r>
-              <a:rPr kumimoji="1" lang="en-US" altLang="ko-KR" sz="4000" spc="-150" dirty="0">
-                <a:solidFill>
-                  <a:schemeClr val="tx1">
-                    <a:lumMod val="75000"/>
-                    <a:lumOff val="25000"/>
-                  </a:schemeClr>
-                </a:solidFill>
-                <a:latin typeface="AppleMyungjo" pitchFamily="2" charset="-127"/>
-                <a:ea typeface="AppleMyungjo" pitchFamily="2" charset="-127"/>
-              </a:rPr>
-              <a:t>API</a:t>
-            </a:r>
-            <a:r>
-              <a:rPr kumimoji="1" lang="ko-KR" altLang="en-US" sz="4000" spc="-150" dirty="0">
-                <a:solidFill>
-                  <a:schemeClr val="tx1">
-                    <a:lumMod val="75000"/>
-                    <a:lumOff val="25000"/>
-                  </a:schemeClr>
-                </a:solidFill>
-                <a:latin typeface="AppleMyungjo" pitchFamily="2" charset="-127"/>
-                <a:ea typeface="AppleMyungjo" pitchFamily="2" charset="-127"/>
-              </a:rPr>
-              <a:t> 서버 구축하기</a:t>
             </a:r>
           </a:p>
         </p:txBody>
@@ -6580,6 +6535,323 @@
     <p:extLst>
       <p:ext uri="{BB962C8B-B14F-4D97-AF65-F5344CB8AC3E}">
         <p14:creationId xmlns:p14="http://schemas.microsoft.com/office/powerpoint/2010/main" val="1662902367"/>
+      </p:ext>
+    </p:extLst>
+  </p:cSld>
+  <p:clrMapOvr>
+    <a:masterClrMapping/>
+  </p:clrMapOvr>
+</p:sld>
+</file>
+
+<file path=ppt/slides/slide7.xml><?xml version="1.0" encoding="utf-8"?>
+<p:sld xmlns:a="http://schemas.openxmlformats.org/drawingml/2006/main" xmlns:r="http://schemas.openxmlformats.org/officeDocument/2006/relationships" xmlns:p="http://schemas.openxmlformats.org/presentationml/2006/main">
+  <p:cSld>
+    <p:spTree>
+      <p:nvGrpSpPr>
+        <p:cNvPr id="1" name=""/>
+        <p:cNvGrpSpPr/>
+        <p:nvPr/>
+      </p:nvGrpSpPr>
+      <p:grpSpPr>
+        <a:xfrm>
+          <a:off x="0" y="0"/>
+          <a:ext cx="0" cy="0"/>
+          <a:chOff x="0" y="0"/>
+          <a:chExt cx="0" cy="0"/>
+        </a:xfrm>
+      </p:grpSpPr>
+      <p:sp>
+        <p:nvSpPr>
+          <p:cNvPr id="2" name="TextBox 1">
+            <a:extLst>
+              <a:ext uri="{FF2B5EF4-FFF2-40B4-BE49-F238E27FC236}">
+                <a16:creationId xmlns:a16="http://schemas.microsoft.com/office/drawing/2014/main" id="{738E9C7B-B3A4-C049-959A-E7366DFC028D}"/>
+              </a:ext>
+            </a:extLst>
+          </p:cNvPr>
+          <p:cNvSpPr txBox="1"/>
+          <p:nvPr/>
+        </p:nvSpPr>
+        <p:spPr>
+          <a:xfrm>
+            <a:off x="1621694" y="2767280"/>
+            <a:ext cx="8948612" cy="1938992"/>
+          </a:xfrm>
+          <a:prstGeom prst="rect">
+            <a:avLst/>
+          </a:prstGeom>
+          <a:noFill/>
+        </p:spPr>
+        <p:txBody>
+          <a:bodyPr wrap="square" rtlCol="0">
+            <a:spAutoFit/>
+          </a:bodyPr>
+          <a:lstStyle/>
+          <a:p>
+            <a:pPr algn="ctr"/>
+            <a:r>
+              <a:rPr kumimoji="1" lang="en-US" altLang="ko-KR" sz="4000" b="1" dirty="0">
+                <a:solidFill>
+                  <a:schemeClr val="tx1">
+                    <a:lumMod val="75000"/>
+                    <a:lumOff val="25000"/>
+                  </a:schemeClr>
+                </a:solidFill>
+                <a:latin typeface="AppleMyungjo" pitchFamily="2" charset="-127"/>
+                <a:ea typeface="AppleMyungjo" pitchFamily="2" charset="-127"/>
+              </a:rPr>
+              <a:t>2. </a:t>
+            </a:r>
+            <a:r>
+              <a:rPr kumimoji="1" lang="ko-KR" altLang="en-US" sz="4000" b="1" dirty="0">
+                <a:solidFill>
+                  <a:schemeClr val="tx1">
+                    <a:lumMod val="75000"/>
+                    <a:lumOff val="25000"/>
+                  </a:schemeClr>
+                </a:solidFill>
+                <a:latin typeface="AppleMyungjo" pitchFamily="2" charset="-127"/>
+                <a:ea typeface="AppleMyungjo" pitchFamily="2" charset="-127"/>
+              </a:rPr>
+              <a:t>프로젝트 개요</a:t>
+            </a:r>
+            <a:endParaRPr kumimoji="1" lang="en-US" altLang="ko-KR" sz="4000" b="1" dirty="0">
+              <a:solidFill>
+                <a:schemeClr val="tx1">
+                  <a:lumMod val="75000"/>
+                  <a:lumOff val="25000"/>
+                </a:schemeClr>
+              </a:solidFill>
+              <a:latin typeface="AppleMyungjo" pitchFamily="2" charset="-127"/>
+              <a:ea typeface="AppleMyungjo" pitchFamily="2" charset="-127"/>
+            </a:endParaRPr>
+          </a:p>
+          <a:p>
+            <a:pPr algn="ctr"/>
+            <a:r>
+              <a:rPr kumimoji="1" lang="en-US" altLang="ko-KR" sz="4000" b="1" dirty="0">
+                <a:solidFill>
+                  <a:srgbClr val="404040"/>
+                </a:solidFill>
+                <a:latin typeface="AppleMyungjo" pitchFamily="2" charset="-127"/>
+                <a:ea typeface="AppleMyungjo" pitchFamily="2" charset="-127"/>
+              </a:rPr>
+              <a:t>Snorkel</a:t>
+            </a:r>
+            <a:r>
+              <a:rPr kumimoji="1" lang="ko-KR" altLang="en-US" sz="4000" b="1" dirty="0">
+                <a:solidFill>
+                  <a:srgbClr val="404040"/>
+                </a:solidFill>
+                <a:latin typeface="AppleMyungjo" pitchFamily="2" charset="-127"/>
+                <a:ea typeface="AppleMyungjo" pitchFamily="2" charset="-127"/>
+              </a:rPr>
+              <a:t>을 이용한 데이터 </a:t>
+            </a:r>
+            <a:r>
+              <a:rPr kumimoji="1" lang="ko-KR" altLang="en-US" sz="4000" b="1" dirty="0" err="1">
+                <a:solidFill>
+                  <a:srgbClr val="404040"/>
+                </a:solidFill>
+                <a:latin typeface="AppleMyungjo" pitchFamily="2" charset="-127"/>
+                <a:ea typeface="AppleMyungjo" pitchFamily="2" charset="-127"/>
+              </a:rPr>
+              <a:t>라벨링</a:t>
+            </a:r>
+            <a:r>
+              <a:rPr kumimoji="1" lang="ko-KR" altLang="en-US" sz="4000" b="1" dirty="0">
+                <a:solidFill>
+                  <a:srgbClr val="404040"/>
+                </a:solidFill>
+                <a:latin typeface="AppleMyungjo" pitchFamily="2" charset="-127"/>
+                <a:ea typeface="AppleMyungjo" pitchFamily="2" charset="-127"/>
+              </a:rPr>
+              <a:t> 프로세스 자동화</a:t>
+            </a:r>
+          </a:p>
+        </p:txBody>
+      </p:sp>
+    </p:spTree>
+    <p:extLst>
+      <p:ext uri="{BB962C8B-B14F-4D97-AF65-F5344CB8AC3E}">
+        <p14:creationId xmlns:p14="http://schemas.microsoft.com/office/powerpoint/2010/main" val="1657865475"/>
+      </p:ext>
+    </p:extLst>
+  </p:cSld>
+  <p:clrMapOvr>
+    <a:masterClrMapping/>
+  </p:clrMapOvr>
+</p:sld>
+</file>
+
+<file path=ppt/slides/slide8.xml><?xml version="1.0" encoding="utf-8"?>
+<p:sld xmlns:a="http://schemas.openxmlformats.org/drawingml/2006/main" xmlns:r="http://schemas.openxmlformats.org/officeDocument/2006/relationships" xmlns:p="http://schemas.openxmlformats.org/presentationml/2006/main">
+  <p:cSld>
+    <p:spTree>
+      <p:nvGrpSpPr>
+        <p:cNvPr id="1" name=""/>
+        <p:cNvGrpSpPr/>
+        <p:nvPr/>
+      </p:nvGrpSpPr>
+      <p:grpSpPr>
+        <a:xfrm>
+          <a:off x="0" y="0"/>
+          <a:ext cx="0" cy="0"/>
+          <a:chOff x="0" y="0"/>
+          <a:chExt cx="0" cy="0"/>
+        </a:xfrm>
+      </p:grpSpPr>
+      <p:pic>
+        <p:nvPicPr>
+          <p:cNvPr id="1026" name="Picture 2">
+            <a:extLst>
+              <a:ext uri="{FF2B5EF4-FFF2-40B4-BE49-F238E27FC236}">
+                <a16:creationId xmlns:a16="http://schemas.microsoft.com/office/drawing/2014/main" id="{07783227-1962-AF43-A9B9-43D19CC13B83}"/>
+              </a:ext>
+            </a:extLst>
+          </p:cNvPr>
+          <p:cNvPicPr>
+            <a:picLocks noChangeAspect="1" noChangeArrowheads="1"/>
+          </p:cNvPicPr>
+          <p:nvPr/>
+        </p:nvPicPr>
+        <p:blipFill>
+          <a:blip r:embed="rId2">
+            <a:extLst>
+              <a:ext uri="{28A0092B-C50C-407E-A947-70E740481C1C}">
+                <a14:useLocalDpi xmlns:a14="http://schemas.microsoft.com/office/drawing/2010/main" val="0"/>
+              </a:ext>
+            </a:extLst>
+          </a:blip>
+          <a:srcRect/>
+          <a:stretch>
+            <a:fillRect/>
+          </a:stretch>
+        </p:blipFill>
+        <p:spPr bwMode="auto">
+          <a:xfrm>
+            <a:off x="1828800" y="668050"/>
+            <a:ext cx="8356987" cy="5521900"/>
+          </a:xfrm>
+          <a:prstGeom prst="rect">
+            <a:avLst/>
+          </a:prstGeom>
+          <a:noFill/>
+          <a:extLst>
+            <a:ext uri="{909E8E84-426E-40DD-AFC4-6F175D3DCCD1}">
+              <a14:hiddenFill xmlns:a14="http://schemas.microsoft.com/office/drawing/2010/main">
+                <a:solidFill>
+                  <a:srgbClr val="FFFFFF"/>
+                </a:solidFill>
+              </a14:hiddenFill>
+            </a:ext>
+          </a:extLst>
+        </p:spPr>
+      </p:pic>
+      <p:pic>
+        <p:nvPicPr>
+          <p:cNvPr id="1028" name="Picture 4">
+            <a:extLst>
+              <a:ext uri="{FF2B5EF4-FFF2-40B4-BE49-F238E27FC236}">
+                <a16:creationId xmlns:a16="http://schemas.microsoft.com/office/drawing/2014/main" id="{37518200-3053-8046-BC2F-C2337B606194}"/>
+              </a:ext>
+            </a:extLst>
+          </p:cNvPr>
+          <p:cNvPicPr>
+            <a:picLocks noChangeAspect="1" noChangeArrowheads="1"/>
+          </p:cNvPicPr>
+          <p:nvPr/>
+        </p:nvPicPr>
+        <p:blipFill>
+          <a:blip r:embed="rId3">
+            <a:extLst>
+              <a:ext uri="{28A0092B-C50C-407E-A947-70E740481C1C}">
+                <a14:useLocalDpi xmlns:a14="http://schemas.microsoft.com/office/drawing/2010/main" val="0"/>
+              </a:ext>
+            </a:extLst>
+          </a:blip>
+          <a:srcRect/>
+          <a:stretch>
+            <a:fillRect/>
+          </a:stretch>
+        </p:blipFill>
+        <p:spPr bwMode="auto">
+          <a:xfrm>
+            <a:off x="6962993" y="4614863"/>
+            <a:ext cx="1164792" cy="482600"/>
+          </a:xfrm>
+          <a:prstGeom prst="rect">
+            <a:avLst/>
+          </a:prstGeom>
+          <a:noFill/>
+          <a:extLst>
+            <a:ext uri="{909E8E84-426E-40DD-AFC4-6F175D3DCCD1}">
+              <a14:hiddenFill xmlns:a14="http://schemas.microsoft.com/office/drawing/2010/main">
+                <a:solidFill>
+                  <a:srgbClr val="FFFFFF"/>
+                </a:solidFill>
+              </a14:hiddenFill>
+            </a:ext>
+          </a:extLst>
+        </p:spPr>
+      </p:pic>
+      <p:sp>
+        <p:nvSpPr>
+          <p:cNvPr id="5" name="직사각형 4">
+            <a:extLst>
+              <a:ext uri="{FF2B5EF4-FFF2-40B4-BE49-F238E27FC236}">
+                <a16:creationId xmlns:a16="http://schemas.microsoft.com/office/drawing/2014/main" id="{D4EA84B1-2069-2347-AF28-97D85E78FF01}"/>
+              </a:ext>
+            </a:extLst>
+          </p:cNvPr>
+          <p:cNvSpPr/>
+          <p:nvPr/>
+        </p:nvSpPr>
+        <p:spPr>
+          <a:xfrm>
+            <a:off x="6962994" y="4614862"/>
+            <a:ext cx="1266606" cy="1575087"/>
+          </a:xfrm>
+          <a:prstGeom prst="rect">
+            <a:avLst/>
+          </a:prstGeom>
+          <a:noFill/>
+          <a:ln w="50800">
+            <a:solidFill>
+              <a:srgbClr val="FF0000"/>
+            </a:solidFill>
+          </a:ln>
+        </p:spPr>
+        <p:style>
+          <a:lnRef idx="2">
+            <a:schemeClr val="accent1">
+              <a:shade val="50000"/>
+            </a:schemeClr>
+          </a:lnRef>
+          <a:fillRef idx="1">
+            <a:schemeClr val="accent1"/>
+          </a:fillRef>
+          <a:effectRef idx="0">
+            <a:schemeClr val="accent1"/>
+          </a:effectRef>
+          <a:fontRef idx="minor">
+            <a:schemeClr val="lt1"/>
+          </a:fontRef>
+        </p:style>
+        <p:txBody>
+          <a:bodyPr rtlCol="0" anchor="ctr"/>
+          <a:lstStyle/>
+          <a:p>
+            <a:pPr algn="ctr"/>
+            <a:endParaRPr kumimoji="1" lang="ko-Kore-KR" altLang="en-US" dirty="0"/>
+          </a:p>
+        </p:txBody>
+      </p:sp>
+    </p:spTree>
+    <p:extLst>
+      <p:ext uri="{BB962C8B-B14F-4D97-AF65-F5344CB8AC3E}">
+        <p14:creationId xmlns:p14="http://schemas.microsoft.com/office/powerpoint/2010/main" val="1917627202"/>
       </p:ext>
     </p:extLst>
   </p:cSld>

</xml_diff>